<commit_message>
removed redundant parentheses in slides
</commit_message>
<xml_diff>
--- a/PowerPoint Slides/12 - Optimization.pptx
+++ b/PowerPoint Slides/12 - Optimization.pptx
@@ -30,7 +30,7 @@
     <p:sldId id="272" r:id="rId18"/>
   </p:sldIdLst>
   <p:sldSz cx="9144000" cy="6858000" type="screen4x3"/>
-  <p:notesSz cx="7010400" cy="9296400"/>
+  <p:notesSz cx="7315200" cy="9601200"/>
   <p:defaultTextStyle>
     <a:defPPr>
       <a:defRPr lang="en-US"/>
@@ -173,12 +173,12 @@
     </p:ext>
     <p:ext uri="{2D200454-40CA-4A62-9FC3-DE9A4176ACB9}">
       <p15:notesGuideLst xmlns:p15="http://schemas.microsoft.com/office/powerpoint/2012/main">
-        <p15:guide id="1" orient="horz" pos="2928">
+        <p15:guide id="1" orient="horz" pos="3024" userDrawn="1">
           <p15:clr>
             <a:srgbClr val="A4A3A4"/>
           </p15:clr>
         </p15:guide>
-        <p15:guide id="2" pos="2208">
+        <p15:guide id="2" pos="2304" userDrawn="1">
           <p15:clr>
             <a:srgbClr val="A4A3A4"/>
           </p15:clr>
@@ -226,8 +226,8 @@
         </p:nvSpPr>
         <p:spPr bwMode="auto">
           <a:xfrm>
-            <a:off x="3971182" y="0"/>
-            <a:ext cx="3039218" cy="465774"/>
+            <a:off x="4143842" y="0"/>
+            <a:ext cx="3171358" cy="481045"/>
           </a:xfrm>
           <a:prstGeom prst="rect">
             <a:avLst/>
@@ -242,13 +242,13 @@
           <a:effectLst/>
         </p:spPr>
         <p:txBody>
-          <a:bodyPr vert="horz" wrap="square" lIns="93159" tIns="46579" rIns="93159" bIns="46579" numCol="1" anchor="t" anchorCtr="0" compatLnSpc="1">
+          <a:bodyPr vert="horz" wrap="square" lIns="96634" tIns="48316" rIns="96634" bIns="48316" numCol="1" anchor="t" anchorCtr="0" compatLnSpc="1">
             <a:prstTxWarp prst="textNoShape">
               <a:avLst/>
             </a:prstTxWarp>
           </a:bodyPr>
           <a:lstStyle>
-            <a:lvl1pPr algn="r" defTabSz="931574">
+            <a:lvl1pPr algn="r" defTabSz="966322">
               <a:defRPr sz="1200"/>
             </a:lvl1pPr>
           </a:lstStyle>
@@ -277,8 +277,8 @@
         </p:nvSpPr>
         <p:spPr bwMode="auto">
           <a:xfrm>
-            <a:off x="3971182" y="8830628"/>
-            <a:ext cx="3039218" cy="465773"/>
+            <a:off x="4143842" y="9120157"/>
+            <a:ext cx="3171358" cy="481044"/>
           </a:xfrm>
           <a:prstGeom prst="rect">
             <a:avLst/>
@@ -293,13 +293,13 @@
           <a:effectLst/>
         </p:spPr>
         <p:txBody>
-          <a:bodyPr vert="horz" wrap="square" lIns="93159" tIns="46579" rIns="93159" bIns="46579" numCol="1" anchor="b" anchorCtr="0" compatLnSpc="1">
+          <a:bodyPr vert="horz" wrap="square" lIns="96634" tIns="48316" rIns="96634" bIns="48316" numCol="1" anchor="b" anchorCtr="0" compatLnSpc="1">
             <a:prstTxWarp prst="textNoShape">
               <a:avLst/>
             </a:prstTxWarp>
           </a:bodyPr>
           <a:lstStyle>
-            <a:lvl1pPr algn="r" defTabSz="931574">
+            <a:lvl1pPr algn="r" defTabSz="966322">
               <a:defRPr sz="1200"/>
             </a:lvl1pPr>
           </a:lstStyle>
@@ -376,8 +376,8 @@
         </p:nvSpPr>
         <p:spPr bwMode="auto">
           <a:xfrm>
-            <a:off x="1" y="0"/>
-            <a:ext cx="3039219" cy="465774"/>
+            <a:off x="2" y="0"/>
+            <a:ext cx="3171359" cy="481045"/>
           </a:xfrm>
           <a:prstGeom prst="rect">
             <a:avLst/>
@@ -392,13 +392,13 @@
           <a:effectLst/>
         </p:spPr>
         <p:txBody>
-          <a:bodyPr vert="horz" wrap="square" lIns="93159" tIns="46579" rIns="93159" bIns="46579" numCol="1" anchor="t" anchorCtr="0" compatLnSpc="1">
+          <a:bodyPr vert="horz" wrap="square" lIns="96634" tIns="48316" rIns="96634" bIns="48316" numCol="1" anchor="t" anchorCtr="0" compatLnSpc="1">
             <a:prstTxWarp prst="textNoShape">
               <a:avLst/>
             </a:prstTxWarp>
           </a:bodyPr>
           <a:lstStyle>
-            <a:lvl1pPr algn="l" defTabSz="931574">
+            <a:lvl1pPr algn="l" defTabSz="966322">
               <a:defRPr sz="1200"/>
             </a:lvl1pPr>
           </a:lstStyle>
@@ -425,8 +425,8 @@
         </p:nvSpPr>
         <p:spPr bwMode="auto">
           <a:xfrm>
-            <a:off x="3971182" y="0"/>
-            <a:ext cx="3039218" cy="465774"/>
+            <a:off x="4143842" y="0"/>
+            <a:ext cx="3171358" cy="481045"/>
           </a:xfrm>
           <a:prstGeom prst="rect">
             <a:avLst/>
@@ -441,13 +441,13 @@
           <a:effectLst/>
         </p:spPr>
         <p:txBody>
-          <a:bodyPr vert="horz" wrap="square" lIns="93159" tIns="46579" rIns="93159" bIns="46579" numCol="1" anchor="t" anchorCtr="0" compatLnSpc="1">
+          <a:bodyPr vert="horz" wrap="square" lIns="96634" tIns="48316" rIns="96634" bIns="48316" numCol="1" anchor="t" anchorCtr="0" compatLnSpc="1">
             <a:prstTxWarp prst="textNoShape">
               <a:avLst/>
             </a:prstTxWarp>
           </a:bodyPr>
           <a:lstStyle>
-            <a:lvl1pPr algn="r" defTabSz="931574">
+            <a:lvl1pPr algn="r" defTabSz="966322">
               <a:defRPr sz="1200"/>
             </a:lvl1pPr>
           </a:lstStyle>
@@ -471,8 +471,8 @@
         </p:nvSpPr>
         <p:spPr bwMode="auto">
           <a:xfrm>
-            <a:off x="1181100" y="696913"/>
-            <a:ext cx="4648200" cy="3486150"/>
+            <a:off x="1257300" y="719138"/>
+            <a:ext cx="4800600" cy="3600450"/>
           </a:xfrm>
           <a:prstGeom prst="rect">
             <a:avLst/>
@@ -500,8 +500,8 @@
         </p:nvSpPr>
         <p:spPr bwMode="auto">
           <a:xfrm>
-            <a:off x="935144" y="4416108"/>
-            <a:ext cx="5140112" cy="4184016"/>
+            <a:off x="975803" y="4560898"/>
+            <a:ext cx="5363595" cy="4321197"/>
           </a:xfrm>
           <a:prstGeom prst="rect">
             <a:avLst/>
@@ -516,7 +516,7 @@
           <a:effectLst/>
         </p:spPr>
         <p:txBody>
-          <a:bodyPr vert="horz" wrap="square" lIns="93159" tIns="46579" rIns="93159" bIns="46579" numCol="1" anchor="t" anchorCtr="0" compatLnSpc="1">
+          <a:bodyPr vert="horz" wrap="square" lIns="96634" tIns="48316" rIns="96634" bIns="48316" numCol="1" anchor="t" anchorCtr="0" compatLnSpc="1">
             <a:prstTxWarp prst="textNoShape">
               <a:avLst/>
             </a:prstTxWarp>
@@ -571,8 +571,8 @@
         </p:nvSpPr>
         <p:spPr bwMode="auto">
           <a:xfrm>
-            <a:off x="1" y="8830628"/>
-            <a:ext cx="3039219" cy="465773"/>
+            <a:off x="2" y="9120157"/>
+            <a:ext cx="3171359" cy="481044"/>
           </a:xfrm>
           <a:prstGeom prst="rect">
             <a:avLst/>
@@ -587,13 +587,13 @@
           <a:effectLst/>
         </p:spPr>
         <p:txBody>
-          <a:bodyPr vert="horz" wrap="square" lIns="93159" tIns="46579" rIns="93159" bIns="46579" numCol="1" anchor="b" anchorCtr="0" compatLnSpc="1">
+          <a:bodyPr vert="horz" wrap="square" lIns="96634" tIns="48316" rIns="96634" bIns="48316" numCol="1" anchor="b" anchorCtr="0" compatLnSpc="1">
             <a:prstTxWarp prst="textNoShape">
               <a:avLst/>
             </a:prstTxWarp>
           </a:bodyPr>
           <a:lstStyle>
-            <a:lvl1pPr algn="l" defTabSz="931574">
+            <a:lvl1pPr algn="l" defTabSz="966322">
               <a:defRPr sz="1200"/>
             </a:lvl1pPr>
           </a:lstStyle>
@@ -617,8 +617,8 @@
         </p:nvSpPr>
         <p:spPr bwMode="auto">
           <a:xfrm>
-            <a:off x="3971182" y="8830628"/>
-            <a:ext cx="3039218" cy="465773"/>
+            <a:off x="4143842" y="9120157"/>
+            <a:ext cx="3171358" cy="481044"/>
           </a:xfrm>
           <a:prstGeom prst="rect">
             <a:avLst/>
@@ -633,13 +633,13 @@
           <a:effectLst/>
         </p:spPr>
         <p:txBody>
-          <a:bodyPr vert="horz" wrap="square" lIns="93159" tIns="46579" rIns="93159" bIns="46579" numCol="1" anchor="b" anchorCtr="0" compatLnSpc="1">
+          <a:bodyPr vert="horz" wrap="square" lIns="96634" tIns="48316" rIns="96634" bIns="48316" numCol="1" anchor="b" anchorCtr="0" compatLnSpc="1">
             <a:prstTxWarp prst="textNoShape">
               <a:avLst/>
             </a:prstTxWarp>
           </a:bodyPr>
           <a:lstStyle>
-            <a:lvl1pPr algn="r" defTabSz="931574">
+            <a:lvl1pPr algn="r" defTabSz="966322">
               <a:defRPr sz="1200"/>
             </a:lvl1pPr>
           </a:lstStyle>
@@ -4892,22 +4892,11 @@
                 <a:latin typeface="Consolas" pitchFamily="49" charset="0"/>
                 <a:cs typeface="Consolas" pitchFamily="49" charset="0"/>
               </a:rPr>
-              <a:t>(4+a[k])*PI</a:t>
-            </a:r>
-            <a:r>
-              <a:rPr lang="en-US">
-                <a:latin typeface="Consolas" pitchFamily="49" charset="0"/>
-                <a:cs typeface="Consolas" pitchFamily="49" charset="0"/>
-              </a:rPr>
-              <a:t>+5</a:t>
-            </a:r>
-            <a:r>
-              <a:rPr lang="en-US"/>
-              <a:t>” can </a:t>
-            </a:r>
-            <a:r>
-              <a:rPr lang="en-US" dirty="0"/>
-              <a:t>be moved outside the loop and precalculated.</a:t>
+              <a:t>(4+a[k])*PI+5</a:t>
+            </a:r>
+            <a:r>
+              <a:rPr lang="en-US" dirty="0"/>
+              <a:t>” can be moved outside the loop and precalculated.</a:t>
             </a:r>
           </a:p>
           <a:p>
@@ -4994,7 +4983,7 @@
                 <a:latin typeface="Consolas" pitchFamily="49" charset="0"/>
                 <a:cs typeface="Consolas" pitchFamily="49" charset="0"/>
               </a:rPr>
-              <a:t>while (j &lt; </a:t>
+              <a:t>while j &lt; </a:t>
             </a:r>
             <a:r>
               <a:rPr lang="en-US" sz="1750" dirty="0" err="1">
@@ -5008,7 +4997,7 @@
                 <a:latin typeface="Consolas" pitchFamily="49" charset="0"/>
                 <a:cs typeface="Consolas" pitchFamily="49" charset="0"/>
               </a:rPr>
-              <a:t>) loop</a:t>
+              <a:t> loop</a:t>
             </a:r>
           </a:p>
           <a:p>
@@ -6102,19 +6091,15 @@
           <a:p>
             <a:pPr lvl="1"/>
             <a:r>
-              <a:rPr lang="en-US"/>
+              <a:rPr lang="en-US" dirty="0"/>
               <a:t>branch reduction (as illustrated in previous slide)</a:t>
             </a:r>
           </a:p>
           <a:p>
             <a:pPr lvl="1"/>
             <a:r>
-              <a:rPr lang="en-US"/>
-              <a:t>constant </a:t>
-            </a:r>
-            <a:r>
-              <a:rPr lang="en-US" dirty="0"/>
-              <a:t>folding</a:t>
+              <a:rPr lang="en-US" dirty="0"/>
+              <a:t>constant folding</a:t>
             </a:r>
           </a:p>
           <a:p>

</xml_diff>

<commit_message>
added a couple of slides on dead code elimination
</commit_message>
<xml_diff>
--- a/PowerPoint Slides/12 - Optimization.pptx
+++ b/PowerPoint Slides/12 - Optimization.pptx
@@ -5,10 +5,10 @@
     <p:sldMasterId id="2147483651" r:id="rId1"/>
   </p:sldMasterIdLst>
   <p:notesMasterIdLst>
-    <p:notesMasterId r:id="rId19"/>
+    <p:notesMasterId r:id="rId21"/>
   </p:notesMasterIdLst>
   <p:handoutMasterIdLst>
-    <p:handoutMasterId r:id="rId20"/>
+    <p:handoutMasterId r:id="rId22"/>
   </p:handoutMasterIdLst>
   <p:sldIdLst>
     <p:sldId id="256" r:id="rId2"/>
@@ -25,9 +25,11 @@
     <p:sldId id="262" r:id="rId13"/>
     <p:sldId id="265" r:id="rId14"/>
     <p:sldId id="267" r:id="rId15"/>
-    <p:sldId id="268" r:id="rId16"/>
-    <p:sldId id="269" r:id="rId17"/>
-    <p:sldId id="272" r:id="rId18"/>
+    <p:sldId id="274" r:id="rId16"/>
+    <p:sldId id="275" r:id="rId17"/>
+    <p:sldId id="268" r:id="rId18"/>
+    <p:sldId id="269" r:id="rId19"/>
+    <p:sldId id="272" r:id="rId20"/>
   </p:sldIdLst>
   <p:sldSz cx="9144000" cy="6858000" type="screen4x3"/>
   <p:notesSz cx="7315200" cy="9601200"/>
@@ -5129,7 +5131,13 @@
       </p:grpSpPr>
       <p:sp>
         <p:nvSpPr>
-          <p:cNvPr id="2" name="Title 1"/>
+          <p:cNvPr id="2" name="Title 1">
+            <a:extLst>
+              <a:ext uri="{FF2B5EF4-FFF2-40B4-BE49-F238E27FC236}">
+                <a16:creationId xmlns:a16="http://schemas.microsoft.com/office/drawing/2014/main" id="{0C1F3DB1-B4E5-4ED7-BA20-3A065104304D}"/>
+              </a:ext>
+            </a:extLst>
+          </p:cNvPr>
           <p:cNvSpPr>
             <a:spLocks noGrp="1"/>
           </p:cNvSpPr>
@@ -5144,14 +5152,20 @@
           <a:p>
             <a:r>
               <a:rPr lang="en-US" dirty="0"/>
-              <a:t>Peephole Optimization</a:t>
-            </a:r>
-          </a:p>
-        </p:txBody>
-      </p:sp>
-      <p:sp>
-        <p:nvSpPr>
-          <p:cNvPr id="3" name="Content Placeholder 2"/>
+              <a:t>Dead Code Elimination</a:t>
+            </a:r>
+          </a:p>
+        </p:txBody>
+      </p:sp>
+      <p:sp>
+        <p:nvSpPr>
+          <p:cNvPr id="3" name="Content Placeholder 2">
+            <a:extLst>
+              <a:ext uri="{FF2B5EF4-FFF2-40B4-BE49-F238E27FC236}">
+                <a16:creationId xmlns:a16="http://schemas.microsoft.com/office/drawing/2014/main" id="{F2027648-B838-4616-BEDF-EA255963A905}"/>
+              </a:ext>
+            </a:extLst>
+          </p:cNvPr>
           <p:cNvSpPr>
             <a:spLocks noGrp="1"/>
           </p:cNvSpPr>
@@ -5166,69 +5180,127 @@
           <a:p>
             <a:r>
               <a:rPr lang="en-US" dirty="0"/>
-              <a:t>Applied to the generated target machine code or a</a:t>
-            </a:r>
-            <a:br>
-              <a:rPr lang="en-US" dirty="0"/>
-            </a:br>
-            <a:r>
-              <a:rPr lang="en-US" dirty="0"/>
-              <a:t>low-level intermediate representation.</a:t>
-            </a:r>
-          </a:p>
-          <a:p>
-            <a:r>
-              <a:rPr lang="en-US" dirty="0"/>
-              <a:t>Basic idea: Analyze a small sequence of instructions at a time (the peephole) for possible performance improvements.</a:t>
-            </a:r>
-          </a:p>
-          <a:p>
-            <a:r>
-              <a:rPr lang="en-US" dirty="0"/>
-              <a:t>The peephole is a small window into the generated code.</a:t>
-            </a:r>
-          </a:p>
-          <a:p>
-            <a:r>
-              <a:rPr lang="en-US" dirty="0"/>
-              <a:t>Examples of peephole optimizations</a:t>
-            </a:r>
-          </a:p>
-          <a:p>
-            <a:pPr lvl="1"/>
-            <a:r>
-              <a:rPr lang="en-US" dirty="0"/>
-              <a:t>elimination of redundant loads and stores</a:t>
-            </a:r>
-          </a:p>
-          <a:p>
-            <a:pPr lvl="1"/>
-            <a:r>
-              <a:rPr lang="en-US" dirty="0"/>
-              <a:t>elimination of branch instructions to other branch instructions</a:t>
-            </a:r>
-          </a:p>
-          <a:p>
-            <a:pPr lvl="1"/>
-            <a:r>
-              <a:rPr lang="en-US" dirty="0"/>
-              <a:t>algebraic identities and strength reduction</a:t>
-            </a:r>
-          </a:p>
-          <a:p>
-            <a:pPr lvl="2">
+              <a:t>Dead (a.k.a., unreachable) code is code that can never be executed.</a:t>
+            </a:r>
+          </a:p>
+          <a:p>
+            <a:r>
+              <a:rPr lang="en-US" dirty="0"/>
+              <a:t>Example.  The following Java code adds debugging feedback to a program based on the value of a boolean variable.</a:t>
+            </a:r>
+          </a:p>
+          <a:p>
+            <a:pPr marL="457200" lvl="1" indent="0">
               <a:buNone/>
             </a:pPr>
             <a:r>
-              <a:rPr lang="en-US" dirty="0"/>
-              <a:t>(can be easier to detect in the target machine code)</a:t>
-            </a:r>
-          </a:p>
-        </p:txBody>
-      </p:sp>
-      <p:sp>
-        <p:nvSpPr>
-          <p:cNvPr id="4" name="Footer Placeholder 3"/>
+              <a:rPr lang="en-US" sz="1800" dirty="0">
+                <a:latin typeface="Consolas" panose="020B0609020204030204" pitchFamily="49" charset="0"/>
+              </a:rPr>
+              <a:t>private static final boolean DEBUG = false;</a:t>
+            </a:r>
+          </a:p>
+          <a:p>
+            <a:pPr marL="457200" lvl="1" indent="0">
+              <a:spcBef>
+                <a:spcPts val="200"/>
+              </a:spcBef>
+              <a:buNone/>
+            </a:pPr>
+            <a:r>
+              <a:rPr lang="en-US" sz="1800" dirty="0">
+                <a:latin typeface="Consolas" panose="020B0609020204030204" pitchFamily="49" charset="0"/>
+              </a:rPr>
+              <a:t>...</a:t>
+            </a:r>
+          </a:p>
+          <a:p>
+            <a:pPr marL="457200" lvl="1" indent="0">
+              <a:spcBef>
+                <a:spcPts val="200"/>
+              </a:spcBef>
+              <a:buNone/>
+            </a:pPr>
+            <a:endParaRPr lang="en-US" sz="1800" dirty="0">
+              <a:latin typeface="Consolas" panose="020B0609020204030204" pitchFamily="49" charset="0"/>
+            </a:endParaRPr>
+          </a:p>
+          <a:p>
+            <a:pPr marL="457200" lvl="1" indent="0">
+              <a:spcBef>
+                <a:spcPts val="200"/>
+              </a:spcBef>
+              <a:buNone/>
+            </a:pPr>
+            <a:r>
+              <a:rPr lang="en-US" sz="1800" dirty="0">
+                <a:latin typeface="Consolas" panose="020B0609020204030204" pitchFamily="49" charset="0"/>
+              </a:rPr>
+              <a:t>if (DEBUG)</a:t>
+            </a:r>
+          </a:p>
+          <a:p>
+            <a:pPr marL="457200" lvl="1" indent="0">
+              <a:spcBef>
+                <a:spcPts val="200"/>
+              </a:spcBef>
+              <a:buNone/>
+            </a:pPr>
+            <a:r>
+              <a:rPr lang="en-US" sz="1800" dirty="0">
+                <a:latin typeface="Consolas" panose="020B0609020204030204" pitchFamily="49" charset="0"/>
+              </a:rPr>
+              <a:t>  {</a:t>
+            </a:r>
+          </a:p>
+          <a:p>
+            <a:pPr marL="457200" lvl="1" indent="0">
+              <a:spcBef>
+                <a:spcPts val="200"/>
+              </a:spcBef>
+              <a:buNone/>
+            </a:pPr>
+            <a:r>
+              <a:rPr lang="en-US" sz="1800" dirty="0">
+                <a:latin typeface="Consolas" panose="020B0609020204030204" pitchFamily="49" charset="0"/>
+              </a:rPr>
+              <a:t>    ...</a:t>
+            </a:r>
+          </a:p>
+          <a:p>
+            <a:pPr marL="457200" lvl="1" indent="0">
+              <a:spcBef>
+                <a:spcPts val="200"/>
+              </a:spcBef>
+              <a:buNone/>
+            </a:pPr>
+            <a:r>
+              <a:rPr lang="en-US" sz="1800" dirty="0">
+                <a:latin typeface="Consolas" panose="020B0609020204030204" pitchFamily="49" charset="0"/>
+              </a:rPr>
+              <a:t>  }</a:t>
+            </a:r>
+          </a:p>
+          <a:p>
+            <a:pPr marL="0" indent="0">
+              <a:buNone/>
+            </a:pPr>
+            <a:r>
+              <a:rPr lang="en-US" dirty="0"/>
+              <a:t> </a:t>
+            </a:r>
+          </a:p>
+        </p:txBody>
+      </p:sp>
+      <p:sp>
+        <p:nvSpPr>
+          <p:cNvPr id="4" name="Footer Placeholder 3">
+            <a:extLst>
+              <a:ext uri="{FF2B5EF4-FFF2-40B4-BE49-F238E27FC236}">
+                <a16:creationId xmlns:a16="http://schemas.microsoft.com/office/drawing/2014/main" id="{2FE3165D-63A9-4C79-81C5-337E304D23FE}"/>
+              </a:ext>
+            </a:extLst>
+          </p:cNvPr>
           <p:cNvSpPr>
             <a:spLocks noGrp="1"/>
           </p:cNvSpPr>
@@ -5253,7 +5325,13 @@
       </p:sp>
       <p:sp>
         <p:nvSpPr>
-          <p:cNvPr id="5" name="Slide Number Placeholder 4"/>
+          <p:cNvPr id="5" name="Slide Number Placeholder 4">
+            <a:extLst>
+              <a:ext uri="{FF2B5EF4-FFF2-40B4-BE49-F238E27FC236}">
+                <a16:creationId xmlns:a16="http://schemas.microsoft.com/office/drawing/2014/main" id="{873BD15C-6D6B-4914-9755-DE81F58F7AEC}"/>
+              </a:ext>
+            </a:extLst>
+          </p:cNvPr>
           <p:cNvSpPr>
             <a:spLocks noGrp="1"/>
           </p:cNvSpPr>
@@ -5285,6 +5363,11 @@
         </p:txBody>
       </p:sp>
     </p:spTree>
+    <p:extLst>
+      <p:ext uri="{BB962C8B-B14F-4D97-AF65-F5344CB8AC3E}">
+        <p14:creationId xmlns:p14="http://schemas.microsoft.com/office/powerpoint/2010/main" val="3382186743"/>
+      </p:ext>
+    </p:extLst>
   </p:cSld>
   <p:clrMapOvr>
     <a:masterClrMapping/>
@@ -5311,7 +5394,13 @@
       </p:grpSpPr>
       <p:sp>
         <p:nvSpPr>
-          <p:cNvPr id="2" name="Title 1"/>
+          <p:cNvPr id="2" name="Title 1">
+            <a:extLst>
+              <a:ext uri="{FF2B5EF4-FFF2-40B4-BE49-F238E27FC236}">
+                <a16:creationId xmlns:a16="http://schemas.microsoft.com/office/drawing/2014/main" id="{0C1F3DB1-B4E5-4ED7-BA20-3A065104304D}"/>
+              </a:ext>
+            </a:extLst>
+          </p:cNvPr>
           <p:cNvSpPr>
             <a:spLocks noGrp="1"/>
           </p:cNvSpPr>
@@ -5326,402 +5415,103 @@
           <a:p>
             <a:r>
               <a:rPr lang="en-US" dirty="0"/>
-              <a:t>Example: Peephole Optimization</a:t>
-            </a:r>
-            <a:endParaRPr lang="en-US" sz="2800" dirty="0"/>
-          </a:p>
-        </p:txBody>
-      </p:sp>
-      <p:sp>
-        <p:nvSpPr>
-          <p:cNvPr id="3" name="Content Placeholder 2"/>
+              <a:t>Dead Code Elimination</a:t>
+            </a:r>
+            <a:br>
+              <a:rPr lang="en-US" dirty="0"/>
+            </a:br>
+            <a:r>
+              <a:rPr lang="en-US" sz="2400" dirty="0"/>
+              <a:t>(continued)</a:t>
+            </a:r>
+          </a:p>
+        </p:txBody>
+      </p:sp>
+      <p:sp>
+        <p:nvSpPr>
+          <p:cNvPr id="3" name="Content Placeholder 2">
+            <a:extLst>
+              <a:ext uri="{FF2B5EF4-FFF2-40B4-BE49-F238E27FC236}">
+                <a16:creationId xmlns:a16="http://schemas.microsoft.com/office/drawing/2014/main" id="{F2027648-B838-4616-BEDF-EA255963A905}"/>
+              </a:ext>
+            </a:extLst>
+          </p:cNvPr>
           <p:cNvSpPr>
             <a:spLocks noGrp="1"/>
           </p:cNvSpPr>
           <p:nvPr>
-            <p:ph sz="half" idx="1"/>
-          </p:nvPr>
-        </p:nvSpPr>
-        <p:spPr/>
-        <p:txBody>
-          <a:bodyPr/>
-          <a:lstStyle/>
-          <a:p>
-            <a:pPr marL="274320" indent="0">
-              <a:spcBef>
-                <a:spcPts val="0"/>
-              </a:spcBef>
-              <a:buNone/>
-            </a:pPr>
-            <a:r>
-              <a:rPr lang="en-US" sz="2000" b="1" dirty="0">
-                <a:cs typeface="Consolas" pitchFamily="49" charset="0"/>
+            <p:ph idx="1"/>
+          </p:nvPr>
+        </p:nvSpPr>
+        <p:spPr/>
+        <p:txBody>
+          <a:bodyPr/>
+          <a:lstStyle/>
+          <a:p>
+            <a:r>
+              <a:rPr lang="en-US" dirty="0"/>
+              <a:t>Since </a:t>
+            </a:r>
+            <a:r>
+              <a:rPr lang="en-US" dirty="0">
+                <a:latin typeface="Consolas" panose="020B0609020204030204" pitchFamily="49" charset="0"/>
               </a:rPr>
-              <a:t>Source Code</a:t>
-            </a:r>
-          </a:p>
-          <a:p>
-            <a:pPr marL="274320" indent="0">
-              <a:spcBef>
-                <a:spcPts val="0"/>
-              </a:spcBef>
-              <a:buNone/>
-            </a:pPr>
-            <a:r>
-              <a:rPr lang="en-US" sz="1800" dirty="0">
-                <a:latin typeface="Consolas" pitchFamily="49" charset="0"/>
-                <a:cs typeface="Consolas" pitchFamily="49" charset="0"/>
+              <a:t>DEBUG</a:t>
+            </a:r>
+            <a:r>
+              <a:rPr lang="en-US" dirty="0"/>
+              <a:t> is final, both the declaration of </a:t>
+            </a:r>
+            <a:r>
+              <a:rPr lang="en-US" dirty="0">
+                <a:latin typeface="Consolas" panose="020B0609020204030204" pitchFamily="49" charset="0"/>
               </a:rPr>
-              <a:t>...</a:t>
-            </a:r>
-          </a:p>
-          <a:p>
-            <a:pPr marL="274320" indent="0">
-              <a:spcBef>
-                <a:spcPts val="0"/>
-              </a:spcBef>
-              <a:buNone/>
-            </a:pPr>
-            <a:r>
-              <a:rPr lang="en-US" sz="1800" dirty="0">
-                <a:latin typeface="Consolas" pitchFamily="49" charset="0"/>
-                <a:cs typeface="Consolas" pitchFamily="49" charset="0"/>
+              <a:t>DEBUG</a:t>
+            </a:r>
+            <a:r>
+              <a:rPr lang="en-US" dirty="0"/>
+              <a:t> and the entire </a:t>
+            </a:r>
+            <a:r>
+              <a:rPr lang="en-US" dirty="0">
+                <a:latin typeface="Consolas" panose="020B0609020204030204" pitchFamily="49" charset="0"/>
               </a:rPr>
-              <a:t>loop</a:t>
-            </a:r>
-          </a:p>
-          <a:p>
-            <a:pPr marL="274320" indent="0">
-              <a:spcBef>
-                <a:spcPts val="0"/>
-              </a:spcBef>
-              <a:buNone/>
-            </a:pPr>
-            <a:r>
-              <a:rPr lang="en-US" sz="1800" dirty="0">
-                <a:latin typeface="Consolas" pitchFamily="49" charset="0"/>
-                <a:cs typeface="Consolas" pitchFamily="49" charset="0"/>
-              </a:rPr>
-              <a:t>   ...</a:t>
-            </a:r>
-          </a:p>
-          <a:p>
-            <a:pPr marL="274320" indent="0">
-              <a:spcBef>
-                <a:spcPts val="0"/>
-              </a:spcBef>
-              <a:buNone/>
-            </a:pPr>
-            <a:endParaRPr lang="en-US" sz="1800" dirty="0">
-              <a:latin typeface="Consolas" pitchFamily="49" charset="0"/>
-              <a:cs typeface="Consolas" pitchFamily="49" charset="0"/>
-            </a:endParaRPr>
-          </a:p>
-          <a:p>
-            <a:pPr marL="274320" indent="0">
-              <a:spcBef>
-                <a:spcPts val="0"/>
-              </a:spcBef>
-              <a:buNone/>
-            </a:pPr>
-            <a:r>
-              <a:rPr lang="en-US" sz="1800" dirty="0">
-                <a:latin typeface="Consolas" pitchFamily="49" charset="0"/>
-                <a:cs typeface="Consolas" pitchFamily="49" charset="0"/>
-              </a:rPr>
-              <a:t>   exit when x &gt; 0;</a:t>
-            </a:r>
-          </a:p>
-          <a:p>
-            <a:pPr marL="274320" indent="0">
-              <a:spcBef>
-                <a:spcPts val="0"/>
-              </a:spcBef>
-              <a:buNone/>
-            </a:pPr>
-            <a:r>
-              <a:rPr lang="en-US" sz="1800" dirty="0">
-                <a:latin typeface="Consolas" pitchFamily="49" charset="0"/>
-                <a:cs typeface="Consolas" pitchFamily="49" charset="0"/>
-              </a:rPr>
-              <a:t>end loop;</a:t>
-            </a:r>
-          </a:p>
-          <a:p>
-            <a:pPr marL="274320" indent="0">
-              <a:spcBef>
-                <a:spcPts val="0"/>
-              </a:spcBef>
-              <a:buNone/>
-            </a:pPr>
-            <a:r>
-              <a:rPr lang="en-US" sz="1800" dirty="0">
-                <a:latin typeface="Consolas" pitchFamily="49" charset="0"/>
-                <a:cs typeface="Consolas" pitchFamily="49" charset="0"/>
-              </a:rPr>
-              <a:t>...</a:t>
-            </a:r>
-          </a:p>
-        </p:txBody>
-      </p:sp>
-      <p:sp>
-        <p:nvSpPr>
-          <p:cNvPr id="9" name="Content Placeholder 8"/>
-          <p:cNvSpPr>
-            <a:spLocks noGrp="1"/>
-          </p:cNvSpPr>
-          <p:nvPr>
-            <p:ph sz="half" idx="2"/>
-          </p:nvPr>
-        </p:nvSpPr>
-        <p:spPr/>
-        <p:txBody>
-          <a:bodyPr/>
-          <a:lstStyle/>
-          <a:p>
-            <a:pPr marL="274320" indent="0">
-              <a:spcBef>
-                <a:spcPts val="0"/>
-              </a:spcBef>
-              <a:buNone/>
-            </a:pPr>
-            <a:r>
-              <a:rPr lang="en-US" sz="2000" b="1" dirty="0">
-                <a:cs typeface="Consolas" pitchFamily="49" charset="0"/>
-              </a:rPr>
-              <a:t>Target Code</a:t>
-            </a:r>
-          </a:p>
-          <a:p>
-            <a:pPr marL="274320" indent="0">
-              <a:spcBef>
-                <a:spcPts val="0"/>
-              </a:spcBef>
-              <a:buNone/>
-            </a:pPr>
-            <a:r>
-              <a:rPr lang="en-US" sz="1800" dirty="0">
-                <a:latin typeface="Consolas" pitchFamily="49" charset="0"/>
-                <a:cs typeface="Consolas" pitchFamily="49" charset="0"/>
-              </a:rPr>
-              <a:t>L4:   </a:t>
-            </a:r>
-          </a:p>
-          <a:p>
-            <a:pPr marL="274320" indent="0">
-              <a:spcBef>
-                <a:spcPts val="0"/>
-              </a:spcBef>
-              <a:buNone/>
-            </a:pPr>
-            <a:r>
-              <a:rPr lang="en-US" sz="1800" dirty="0">
-                <a:latin typeface="Consolas" pitchFamily="49" charset="0"/>
-                <a:cs typeface="Consolas" pitchFamily="49" charset="0"/>
-              </a:rPr>
-              <a:t>   ...</a:t>
-            </a:r>
-          </a:p>
-          <a:p>
-            <a:pPr marL="274320" indent="0">
-              <a:spcBef>
-                <a:spcPts val="0"/>
-              </a:spcBef>
-              <a:buNone/>
-            </a:pPr>
-            <a:r>
-              <a:rPr lang="en-US" sz="1800" dirty="0">
-                <a:latin typeface="Consolas" pitchFamily="49" charset="0"/>
-                <a:cs typeface="Consolas" pitchFamily="49" charset="0"/>
-              </a:rPr>
-              <a:t>   LDLADDR 0</a:t>
-            </a:r>
-          </a:p>
-          <a:p>
-            <a:pPr marL="274320" indent="0">
-              <a:spcBef>
-                <a:spcPts val="0"/>
-              </a:spcBef>
-              <a:buNone/>
-            </a:pPr>
-            <a:r>
-              <a:rPr lang="en-US" sz="1800" dirty="0">
-                <a:latin typeface="Consolas" pitchFamily="49" charset="0"/>
-                <a:cs typeface="Consolas" pitchFamily="49" charset="0"/>
-              </a:rPr>
-              <a:t>   LOADW</a:t>
-            </a:r>
-          </a:p>
-          <a:p>
-            <a:pPr marL="274320" indent="0">
-              <a:spcBef>
-                <a:spcPts val="0"/>
-              </a:spcBef>
-              <a:buNone/>
-            </a:pPr>
-            <a:r>
-              <a:rPr lang="en-US" sz="1800" dirty="0">
-                <a:latin typeface="Consolas" pitchFamily="49" charset="0"/>
-                <a:cs typeface="Consolas" pitchFamily="49" charset="0"/>
-              </a:rPr>
-              <a:t>   LDCINT 0</a:t>
-            </a:r>
-          </a:p>
-          <a:p>
-            <a:pPr marL="274320" indent="0">
-              <a:spcBef>
-                <a:spcPts val="0"/>
-              </a:spcBef>
-              <a:buNone/>
-            </a:pPr>
-            <a:r>
-              <a:rPr lang="en-US" sz="1800" dirty="0">
-                <a:latin typeface="Consolas" pitchFamily="49" charset="0"/>
-                <a:cs typeface="Consolas" pitchFamily="49" charset="0"/>
-              </a:rPr>
-              <a:t>   CMP</a:t>
-            </a:r>
-          </a:p>
-          <a:p>
-            <a:pPr marL="274320" indent="0">
-              <a:spcBef>
-                <a:spcPts val="0"/>
-              </a:spcBef>
-              <a:buNone/>
-            </a:pPr>
-            <a:r>
-              <a:rPr lang="en-US" sz="1800" dirty="0">
-                <a:latin typeface="Consolas" pitchFamily="49" charset="0"/>
-                <a:cs typeface="Consolas" pitchFamily="49" charset="0"/>
-              </a:rPr>
-              <a:t>   BG L5</a:t>
-            </a:r>
-          </a:p>
-          <a:p>
-            <a:pPr marL="274320" indent="0">
-              <a:spcBef>
-                <a:spcPts val="0"/>
-              </a:spcBef>
-              <a:buNone/>
-            </a:pPr>
-            <a:r>
-              <a:rPr lang="en-US" sz="1800" dirty="0">
-                <a:latin typeface="Consolas" pitchFamily="49" charset="0"/>
-                <a:cs typeface="Consolas" pitchFamily="49" charset="0"/>
-              </a:rPr>
-              <a:t>   BR L4</a:t>
-            </a:r>
-          </a:p>
-          <a:p>
-            <a:pPr marL="274320" indent="0">
-              <a:spcBef>
-                <a:spcPts val="0"/>
-              </a:spcBef>
-              <a:buNone/>
-            </a:pPr>
-            <a:r>
-              <a:rPr lang="en-US" sz="1800" dirty="0">
-                <a:latin typeface="Consolas" pitchFamily="49" charset="0"/>
-                <a:cs typeface="Consolas" pitchFamily="49" charset="0"/>
-              </a:rPr>
-              <a:t>L5:</a:t>
-            </a:r>
-          </a:p>
-          <a:p>
-            <a:pPr marL="274320" indent="0">
-              <a:spcBef>
-                <a:spcPts val="0"/>
-              </a:spcBef>
-              <a:buNone/>
-            </a:pPr>
-            <a:r>
-              <a:rPr lang="en-US" sz="1800" dirty="0">
-                <a:latin typeface="Consolas" pitchFamily="49" charset="0"/>
-                <a:cs typeface="Consolas" pitchFamily="49" charset="0"/>
-              </a:rPr>
-              <a:t>   BR L9</a:t>
-            </a:r>
-          </a:p>
-          <a:p>
-            <a:pPr marL="274320" indent="0">
-              <a:spcBef>
-                <a:spcPts val="0"/>
-              </a:spcBef>
-              <a:buNone/>
-            </a:pPr>
-            <a:r>
-              <a:rPr lang="en-US" sz="1800" dirty="0">
-                <a:latin typeface="Consolas" pitchFamily="49" charset="0"/>
-                <a:cs typeface="Consolas" pitchFamily="49" charset="0"/>
-              </a:rPr>
-              <a:t>L8:</a:t>
-            </a:r>
-          </a:p>
-          <a:p>
-            <a:pPr marL="274320" indent="0">
-              <a:spcBef>
-                <a:spcPts val="0"/>
-              </a:spcBef>
-              <a:buNone/>
-            </a:pPr>
-            <a:r>
-              <a:rPr lang="en-US" sz="1800" dirty="0">
-                <a:latin typeface="Consolas" pitchFamily="49" charset="0"/>
-                <a:cs typeface="Consolas" pitchFamily="49" charset="0"/>
-              </a:rPr>
-              <a:t>   LDLADDR 0</a:t>
-            </a:r>
-          </a:p>
-          <a:p>
-            <a:pPr marL="274320" indent="0">
-              <a:spcBef>
-                <a:spcPts val="0"/>
-              </a:spcBef>
-              <a:buNone/>
-            </a:pPr>
-            <a:r>
-              <a:rPr lang="en-US" sz="1800" dirty="0">
-                <a:latin typeface="Consolas" pitchFamily="49" charset="0"/>
-                <a:cs typeface="Consolas" pitchFamily="49" charset="0"/>
-              </a:rPr>
-              <a:t>   LOADW</a:t>
-            </a:r>
-          </a:p>
-          <a:p>
-            <a:pPr marL="274320" indent="0">
-              <a:spcBef>
-                <a:spcPts val="0"/>
-              </a:spcBef>
-              <a:buNone/>
-            </a:pPr>
-            <a:r>
-              <a:rPr lang="en-US" sz="1800" dirty="0">
-                <a:latin typeface="Consolas" pitchFamily="49" charset="0"/>
-                <a:cs typeface="Consolas" pitchFamily="49" charset="0"/>
-              </a:rPr>
-              <a:t>   LDCINT 0</a:t>
-            </a:r>
-          </a:p>
-          <a:p>
-            <a:pPr marL="274320" indent="0">
-              <a:spcBef>
-                <a:spcPts val="0"/>
-              </a:spcBef>
-              <a:buNone/>
-            </a:pPr>
-            <a:r>
-              <a:rPr lang="en-US" sz="1800" dirty="0">
-                <a:latin typeface="Consolas" pitchFamily="49" charset="0"/>
-                <a:cs typeface="Consolas" pitchFamily="49" charset="0"/>
-              </a:rPr>
-              <a:t>   ...</a:t>
-            </a:r>
-          </a:p>
-        </p:txBody>
-      </p:sp>
-      <p:sp>
-        <p:nvSpPr>
-          <p:cNvPr id="4" name="Footer Placeholder 3"/>
+              <a:t>if</a:t>
+            </a:r>
+            <a:r>
+              <a:rPr lang="en-US" dirty="0"/>
+              <a:t> statement can be removed without affecting the program results.</a:t>
+            </a:r>
+          </a:p>
+          <a:p>
+            <a:r>
+              <a:rPr lang="en-US" dirty="0"/>
+              <a:t>Like many other compilers, the Java compiler will perform this optimization.</a:t>
+            </a:r>
+          </a:p>
+          <a:p>
+            <a:r>
+              <a:rPr lang="en-US" dirty="0"/>
+              <a:t>An analogous example in Kotlin is similarly optimized by the Kotlin compiler.</a:t>
+            </a:r>
+          </a:p>
+          <a:p>
+            <a:r>
+              <a:rPr lang="en-US" dirty="0"/>
+              <a:t>Note that dead code elimination affects only the size of the generated code, not the speed at which it executes.</a:t>
+            </a:r>
+          </a:p>
+        </p:txBody>
+      </p:sp>
+      <p:sp>
+        <p:nvSpPr>
+          <p:cNvPr id="4" name="Footer Placeholder 3">
+            <a:extLst>
+              <a:ext uri="{FF2B5EF4-FFF2-40B4-BE49-F238E27FC236}">
+                <a16:creationId xmlns:a16="http://schemas.microsoft.com/office/drawing/2014/main" id="{2FE3165D-63A9-4C79-81C5-337E304D23FE}"/>
+              </a:ext>
+            </a:extLst>
+          </p:cNvPr>
           <p:cNvSpPr>
             <a:spLocks noGrp="1"/>
           </p:cNvSpPr>
@@ -5746,7 +5536,13 @@
       </p:sp>
       <p:sp>
         <p:nvSpPr>
-          <p:cNvPr id="5" name="Slide Number Placeholder 4"/>
+          <p:cNvPr id="5" name="Slide Number Placeholder 4">
+            <a:extLst>
+              <a:ext uri="{FF2B5EF4-FFF2-40B4-BE49-F238E27FC236}">
+                <a16:creationId xmlns:a16="http://schemas.microsoft.com/office/drawing/2014/main" id="{873BD15C-6D6B-4914-9755-DE81F58F7AEC}"/>
+              </a:ext>
+            </a:extLst>
+          </p:cNvPr>
           <p:cNvSpPr>
             <a:spLocks noGrp="1"/>
           </p:cNvSpPr>
@@ -5777,185 +5573,12 @@
           </a:p>
         </p:txBody>
       </p:sp>
-      <p:sp>
-        <p:nvSpPr>
-          <p:cNvPr id="6" name="Rectangle 5"/>
-          <p:cNvSpPr/>
-          <p:nvPr/>
-        </p:nvSpPr>
-        <p:spPr bwMode="auto">
-          <a:xfrm>
-            <a:off x="4800600" y="3361765"/>
-            <a:ext cx="2743200" cy="822960"/>
-          </a:xfrm>
-          <a:prstGeom prst="rect">
-            <a:avLst/>
-          </a:prstGeom>
-          <a:noFill/>
-          <a:ln w="9525" cap="flat" cmpd="sng" algn="ctr">
-            <a:solidFill>
-              <a:schemeClr val="tx1"/>
-            </a:solidFill>
-            <a:prstDash val="solid"/>
-            <a:round/>
-            <a:headEnd type="none" w="med" len="med"/>
-            <a:tailEnd type="none" w="med" len="med"/>
-          </a:ln>
-          <a:effectLst/>
-        </p:spPr>
-        <p:txBody>
-          <a:bodyPr vert="horz" wrap="none" lIns="92075" tIns="46038" rIns="92075" bIns="46038" numCol="1" rtlCol="0" anchor="ctr" anchorCtr="0" compatLnSpc="1">
-            <a:prstTxWarp prst="textNoShape">
-              <a:avLst/>
-            </a:prstTxWarp>
-          </a:bodyPr>
-          <a:lstStyle/>
-          <a:p>
-            <a:pPr marL="0" marR="0" indent="0" algn="ctr" defTabSz="914400" rtl="0" eaLnBrk="0" fontAlgn="base" latinLnBrk="0" hangingPunct="0">
-              <a:lnSpc>
-                <a:spcPct val="100000"/>
-              </a:lnSpc>
-              <a:spcBef>
-                <a:spcPct val="0"/>
-              </a:spcBef>
-              <a:spcAft>
-                <a:spcPct val="0"/>
-              </a:spcAft>
-              <a:buClrTx/>
-              <a:buSzTx/>
-              <a:buFontTx/>
-              <a:buNone/>
-              <a:tabLst/>
-            </a:pPr>
-            <a:endParaRPr kumimoji="0" lang="en-US" sz="2400" b="0" i="0" u="none" strike="noStrike" cap="none" normalizeH="0" baseline="0">
-              <a:ln>
-                <a:noFill/>
-              </a:ln>
-              <a:solidFill>
-                <a:schemeClr val="tx1"/>
-              </a:solidFill>
-              <a:effectLst/>
-              <a:latin typeface="Arial" charset="0"/>
-            </a:endParaRPr>
-          </a:p>
-        </p:txBody>
-      </p:sp>
-      <p:sp>
-        <p:nvSpPr>
-          <p:cNvPr id="7" name="TextBox 6"/>
-          <p:cNvSpPr txBox="1"/>
-          <p:nvPr/>
-        </p:nvSpPr>
-        <p:spPr>
-          <a:xfrm>
-            <a:off x="6410156" y="3361765"/>
-            <a:ext cx="1133644" cy="369332"/>
-          </a:xfrm>
-          <a:prstGeom prst="rect">
-            <a:avLst/>
-          </a:prstGeom>
-          <a:noFill/>
-          <a:ln>
-            <a:solidFill>
-              <a:schemeClr val="tx1"/>
-            </a:solidFill>
-          </a:ln>
-        </p:spPr>
-        <p:txBody>
-          <a:bodyPr wrap="none" rtlCol="0">
-            <a:spAutoFit/>
-          </a:bodyPr>
-          <a:lstStyle/>
-          <a:p>
-            <a:r>
-              <a:rPr lang="en-US" sz="1800" dirty="0"/>
-              <a:t>peephole</a:t>
-            </a:r>
-          </a:p>
-        </p:txBody>
-      </p:sp>
-      <p:sp>
-        <p:nvSpPr>
-          <p:cNvPr id="8" name="TextBox 7"/>
-          <p:cNvSpPr txBox="1"/>
-          <p:nvPr/>
-        </p:nvSpPr>
-        <p:spPr>
-          <a:xfrm>
-            <a:off x="3193212" y="3200400"/>
-            <a:ext cx="1531188" cy="1754326"/>
-          </a:xfrm>
-          <a:prstGeom prst="rect">
-            <a:avLst/>
-          </a:prstGeom>
-          <a:noFill/>
-        </p:spPr>
-        <p:txBody>
-          <a:bodyPr wrap="none" rtlCol="0">
-            <a:spAutoFit/>
-          </a:bodyPr>
-          <a:lstStyle/>
-          <a:p>
-            <a:pPr algn="l"/>
-            <a:r>
-              <a:rPr lang="en-US" sz="1800" dirty="0">
-                <a:latin typeface="+mn-lt"/>
-              </a:rPr>
-              <a:t>Optimization:</a:t>
-            </a:r>
-          </a:p>
-          <a:p>
-            <a:pPr algn="l"/>
-            <a:r>
-              <a:rPr lang="en-US" sz="1800" dirty="0">
-                <a:latin typeface="+mn-lt"/>
-              </a:rPr>
-              <a:t>Replace </a:t>
-            </a:r>
-          </a:p>
-          <a:p>
-            <a:pPr algn="l"/>
-            <a:r>
-              <a:rPr lang="en-US" sz="1800" dirty="0">
-                <a:latin typeface="Consolas" panose="020B0609020204030204" pitchFamily="49" charset="0"/>
-              </a:rPr>
-              <a:t>   BG L5</a:t>
-            </a:r>
-          </a:p>
-          <a:p>
-            <a:pPr algn="l"/>
-            <a:r>
-              <a:rPr lang="en-US" sz="1800" dirty="0">
-                <a:latin typeface="Consolas" panose="020B0609020204030204" pitchFamily="49" charset="0"/>
-              </a:rPr>
-              <a:t>   BR L4</a:t>
-            </a:r>
-          </a:p>
-          <a:p>
-            <a:pPr algn="l"/>
-            <a:r>
-              <a:rPr lang="en-US" sz="1800" dirty="0">
-                <a:latin typeface="+mn-lt"/>
-              </a:rPr>
-              <a:t>with</a:t>
-            </a:r>
-          </a:p>
-          <a:p>
-            <a:pPr algn="l"/>
-            <a:r>
-              <a:rPr lang="en-US" sz="1800" dirty="0">
-                <a:latin typeface="Consolas" panose="020B0609020204030204" pitchFamily="49" charset="0"/>
-              </a:rPr>
-              <a:t>   BLE L4</a:t>
-            </a:r>
-            <a:endParaRPr lang="en-US" sz="1800" dirty="0">
-              <a:latin typeface="Consolas" panose="020B0609020204030204" pitchFamily="49" charset="0"/>
-              <a:cs typeface="Consolas" pitchFamily="49" charset="0"/>
-            </a:endParaRPr>
-          </a:p>
-        </p:txBody>
-      </p:sp>
     </p:spTree>
+    <p:extLst>
+      <p:ext uri="{BB962C8B-B14F-4D97-AF65-F5344CB8AC3E}">
+        <p14:creationId xmlns:p14="http://schemas.microsoft.com/office/powerpoint/2010/main" val="1209755899"/>
+      </p:ext>
+    </p:extLst>
   </p:cSld>
   <p:clrMapOvr>
     <a:masterClrMapping/>
@@ -5982,6 +5605,859 @@
       </p:grpSpPr>
       <p:sp>
         <p:nvSpPr>
+          <p:cNvPr id="2" name="Title 1"/>
+          <p:cNvSpPr>
+            <a:spLocks noGrp="1"/>
+          </p:cNvSpPr>
+          <p:nvPr>
+            <p:ph type="title"/>
+          </p:nvPr>
+        </p:nvSpPr>
+        <p:spPr/>
+        <p:txBody>
+          <a:bodyPr/>
+          <a:lstStyle/>
+          <a:p>
+            <a:r>
+              <a:rPr lang="en-US" dirty="0"/>
+              <a:t>Peephole Optimization</a:t>
+            </a:r>
+          </a:p>
+        </p:txBody>
+      </p:sp>
+      <p:sp>
+        <p:nvSpPr>
+          <p:cNvPr id="3" name="Content Placeholder 2"/>
+          <p:cNvSpPr>
+            <a:spLocks noGrp="1"/>
+          </p:cNvSpPr>
+          <p:nvPr>
+            <p:ph idx="1"/>
+          </p:nvPr>
+        </p:nvSpPr>
+        <p:spPr/>
+        <p:txBody>
+          <a:bodyPr/>
+          <a:lstStyle/>
+          <a:p>
+            <a:r>
+              <a:rPr lang="en-US" dirty="0"/>
+              <a:t>Applied to the generated target machine code or a</a:t>
+            </a:r>
+            <a:br>
+              <a:rPr lang="en-US" dirty="0"/>
+            </a:br>
+            <a:r>
+              <a:rPr lang="en-US" dirty="0"/>
+              <a:t>low-level intermediate representation.</a:t>
+            </a:r>
+          </a:p>
+          <a:p>
+            <a:r>
+              <a:rPr lang="en-US" dirty="0"/>
+              <a:t>Basic idea: Analyze a small sequence of instructions at a time (the peephole) for possible performance improvements.</a:t>
+            </a:r>
+          </a:p>
+          <a:p>
+            <a:r>
+              <a:rPr lang="en-US" dirty="0"/>
+              <a:t>The peephole is a small window into the generated code.</a:t>
+            </a:r>
+          </a:p>
+          <a:p>
+            <a:r>
+              <a:rPr lang="en-US" dirty="0"/>
+              <a:t>Examples of peephole optimizations</a:t>
+            </a:r>
+          </a:p>
+          <a:p>
+            <a:pPr lvl="1"/>
+            <a:r>
+              <a:rPr lang="en-US" dirty="0"/>
+              <a:t>elimination of redundant loads and stores</a:t>
+            </a:r>
+          </a:p>
+          <a:p>
+            <a:pPr lvl="1"/>
+            <a:r>
+              <a:rPr lang="en-US" dirty="0"/>
+              <a:t>elimination of branch instructions to other branch instructions</a:t>
+            </a:r>
+          </a:p>
+          <a:p>
+            <a:pPr lvl="1"/>
+            <a:r>
+              <a:rPr lang="en-US" dirty="0"/>
+              <a:t>algebraic identities and strength reduction</a:t>
+            </a:r>
+          </a:p>
+          <a:p>
+            <a:pPr lvl="2">
+              <a:buNone/>
+            </a:pPr>
+            <a:r>
+              <a:rPr lang="en-US" dirty="0"/>
+              <a:t>(can be easier to detect in the target machine code)</a:t>
+            </a:r>
+          </a:p>
+        </p:txBody>
+      </p:sp>
+      <p:sp>
+        <p:nvSpPr>
+          <p:cNvPr id="4" name="Footer Placeholder 3"/>
+          <p:cNvSpPr>
+            <a:spLocks noGrp="1"/>
+          </p:cNvSpPr>
+          <p:nvPr>
+            <p:ph type="ftr" sz="quarter" idx="10"/>
+          </p:nvPr>
+        </p:nvSpPr>
+        <p:spPr/>
+        <p:txBody>
+          <a:bodyPr/>
+          <a:lstStyle/>
+          <a:p>
+            <a:pPr>
+              <a:defRPr/>
+            </a:pPr>
+            <a:r>
+              <a:rPr lang="en-US"/>
+              <a:t>©SoftMoore Consulting</a:t>
+            </a:r>
+          </a:p>
+        </p:txBody>
+      </p:sp>
+      <p:sp>
+        <p:nvSpPr>
+          <p:cNvPr id="5" name="Slide Number Placeholder 4"/>
+          <p:cNvSpPr>
+            <a:spLocks noGrp="1"/>
+          </p:cNvSpPr>
+          <p:nvPr>
+            <p:ph type="sldNum" sz="quarter" idx="11"/>
+          </p:nvPr>
+        </p:nvSpPr>
+        <p:spPr/>
+        <p:txBody>
+          <a:bodyPr/>
+          <a:lstStyle/>
+          <a:p>
+            <a:pPr>
+              <a:defRPr/>
+            </a:pPr>
+            <a:r>
+              <a:rPr lang="en-US"/>
+              <a:t>Slide </a:t>
+            </a:r>
+            <a:fld id="{CD33D74D-A874-47AE-8B06-6763BD644256}" type="slidenum">
+              <a:rPr lang="en-US" smtClean="0"/>
+              <a:pPr>
+                <a:defRPr/>
+              </a:pPr>
+              <a:t>17</a:t>
+            </a:fld>
+            <a:endParaRPr lang="en-US"/>
+          </a:p>
+        </p:txBody>
+      </p:sp>
+    </p:spTree>
+  </p:cSld>
+  <p:clrMapOvr>
+    <a:masterClrMapping/>
+  </p:clrMapOvr>
+</p:sld>
+</file>
+
+<file path=ppt/slides/slide18.xml><?xml version="1.0" encoding="utf-8"?>
+<p:sld xmlns:a="http://schemas.openxmlformats.org/drawingml/2006/main" xmlns:r="http://schemas.openxmlformats.org/officeDocument/2006/relationships" xmlns:p="http://schemas.openxmlformats.org/presentationml/2006/main">
+  <p:cSld>
+    <p:spTree>
+      <p:nvGrpSpPr>
+        <p:cNvPr id="1" name=""/>
+        <p:cNvGrpSpPr/>
+        <p:nvPr/>
+      </p:nvGrpSpPr>
+      <p:grpSpPr>
+        <a:xfrm>
+          <a:off x="0" y="0"/>
+          <a:ext cx="0" cy="0"/>
+          <a:chOff x="0" y="0"/>
+          <a:chExt cx="0" cy="0"/>
+        </a:xfrm>
+      </p:grpSpPr>
+      <p:sp>
+        <p:nvSpPr>
+          <p:cNvPr id="2" name="Title 1"/>
+          <p:cNvSpPr>
+            <a:spLocks noGrp="1"/>
+          </p:cNvSpPr>
+          <p:nvPr>
+            <p:ph type="title"/>
+          </p:nvPr>
+        </p:nvSpPr>
+        <p:spPr/>
+        <p:txBody>
+          <a:bodyPr/>
+          <a:lstStyle/>
+          <a:p>
+            <a:r>
+              <a:rPr lang="en-US" dirty="0"/>
+              <a:t>Example: Peephole Optimization</a:t>
+            </a:r>
+            <a:endParaRPr lang="en-US" sz="2800" dirty="0"/>
+          </a:p>
+        </p:txBody>
+      </p:sp>
+      <p:sp>
+        <p:nvSpPr>
+          <p:cNvPr id="3" name="Content Placeholder 2"/>
+          <p:cNvSpPr>
+            <a:spLocks noGrp="1"/>
+          </p:cNvSpPr>
+          <p:nvPr>
+            <p:ph sz="half" idx="1"/>
+          </p:nvPr>
+        </p:nvSpPr>
+        <p:spPr/>
+        <p:txBody>
+          <a:bodyPr/>
+          <a:lstStyle/>
+          <a:p>
+            <a:pPr marL="274320" indent="0">
+              <a:spcBef>
+                <a:spcPts val="0"/>
+              </a:spcBef>
+              <a:buNone/>
+            </a:pPr>
+            <a:r>
+              <a:rPr lang="en-US" sz="2000" b="1" dirty="0">
+                <a:cs typeface="Consolas" pitchFamily="49" charset="0"/>
+              </a:rPr>
+              <a:t>Source Code</a:t>
+            </a:r>
+          </a:p>
+          <a:p>
+            <a:pPr marL="274320" indent="0">
+              <a:spcBef>
+                <a:spcPts val="0"/>
+              </a:spcBef>
+              <a:buNone/>
+            </a:pPr>
+            <a:r>
+              <a:rPr lang="en-US" sz="1800" dirty="0">
+                <a:latin typeface="Consolas" pitchFamily="49" charset="0"/>
+                <a:cs typeface="Consolas" pitchFamily="49" charset="0"/>
+              </a:rPr>
+              <a:t>...</a:t>
+            </a:r>
+          </a:p>
+          <a:p>
+            <a:pPr marL="274320" indent="0">
+              <a:spcBef>
+                <a:spcPts val="0"/>
+              </a:spcBef>
+              <a:buNone/>
+            </a:pPr>
+            <a:r>
+              <a:rPr lang="en-US" sz="1800" dirty="0">
+                <a:latin typeface="Consolas" pitchFamily="49" charset="0"/>
+                <a:cs typeface="Consolas" pitchFamily="49" charset="0"/>
+              </a:rPr>
+              <a:t>loop</a:t>
+            </a:r>
+          </a:p>
+          <a:p>
+            <a:pPr marL="274320" indent="0">
+              <a:spcBef>
+                <a:spcPts val="0"/>
+              </a:spcBef>
+              <a:buNone/>
+            </a:pPr>
+            <a:r>
+              <a:rPr lang="en-US" sz="1800" dirty="0">
+                <a:latin typeface="Consolas" pitchFamily="49" charset="0"/>
+                <a:cs typeface="Consolas" pitchFamily="49" charset="0"/>
+              </a:rPr>
+              <a:t>   ...</a:t>
+            </a:r>
+          </a:p>
+          <a:p>
+            <a:pPr marL="274320" indent="0">
+              <a:spcBef>
+                <a:spcPts val="0"/>
+              </a:spcBef>
+              <a:buNone/>
+            </a:pPr>
+            <a:endParaRPr lang="en-US" sz="1800" dirty="0">
+              <a:latin typeface="Consolas" pitchFamily="49" charset="0"/>
+              <a:cs typeface="Consolas" pitchFamily="49" charset="0"/>
+            </a:endParaRPr>
+          </a:p>
+          <a:p>
+            <a:pPr marL="274320" indent="0">
+              <a:spcBef>
+                <a:spcPts val="0"/>
+              </a:spcBef>
+              <a:buNone/>
+            </a:pPr>
+            <a:r>
+              <a:rPr lang="en-US" sz="1800" dirty="0">
+                <a:latin typeface="Consolas" pitchFamily="49" charset="0"/>
+                <a:cs typeface="Consolas" pitchFamily="49" charset="0"/>
+              </a:rPr>
+              <a:t>   exit when x &gt; 0;</a:t>
+            </a:r>
+          </a:p>
+          <a:p>
+            <a:pPr marL="274320" indent="0">
+              <a:spcBef>
+                <a:spcPts val="0"/>
+              </a:spcBef>
+              <a:buNone/>
+            </a:pPr>
+            <a:r>
+              <a:rPr lang="en-US" sz="1800" dirty="0">
+                <a:latin typeface="Consolas" pitchFamily="49" charset="0"/>
+                <a:cs typeface="Consolas" pitchFamily="49" charset="0"/>
+              </a:rPr>
+              <a:t>end loop;</a:t>
+            </a:r>
+          </a:p>
+          <a:p>
+            <a:pPr marL="274320" indent="0">
+              <a:spcBef>
+                <a:spcPts val="0"/>
+              </a:spcBef>
+              <a:buNone/>
+            </a:pPr>
+            <a:r>
+              <a:rPr lang="en-US" sz="1800" dirty="0">
+                <a:latin typeface="Consolas" pitchFamily="49" charset="0"/>
+                <a:cs typeface="Consolas" pitchFamily="49" charset="0"/>
+              </a:rPr>
+              <a:t>...</a:t>
+            </a:r>
+          </a:p>
+        </p:txBody>
+      </p:sp>
+      <p:sp>
+        <p:nvSpPr>
+          <p:cNvPr id="9" name="Content Placeholder 8"/>
+          <p:cNvSpPr>
+            <a:spLocks noGrp="1"/>
+          </p:cNvSpPr>
+          <p:nvPr>
+            <p:ph sz="half" idx="2"/>
+          </p:nvPr>
+        </p:nvSpPr>
+        <p:spPr/>
+        <p:txBody>
+          <a:bodyPr/>
+          <a:lstStyle/>
+          <a:p>
+            <a:pPr marL="274320" indent="0">
+              <a:spcBef>
+                <a:spcPts val="0"/>
+              </a:spcBef>
+              <a:buNone/>
+            </a:pPr>
+            <a:r>
+              <a:rPr lang="en-US" sz="2000" b="1" dirty="0">
+                <a:cs typeface="Consolas" pitchFamily="49" charset="0"/>
+              </a:rPr>
+              <a:t>Target Code</a:t>
+            </a:r>
+          </a:p>
+          <a:p>
+            <a:pPr marL="274320" indent="0">
+              <a:spcBef>
+                <a:spcPts val="0"/>
+              </a:spcBef>
+              <a:buNone/>
+            </a:pPr>
+            <a:r>
+              <a:rPr lang="en-US" sz="1800" dirty="0">
+                <a:latin typeface="Consolas" pitchFamily="49" charset="0"/>
+                <a:cs typeface="Consolas" pitchFamily="49" charset="0"/>
+              </a:rPr>
+              <a:t>L4:   </a:t>
+            </a:r>
+          </a:p>
+          <a:p>
+            <a:pPr marL="274320" indent="0">
+              <a:spcBef>
+                <a:spcPts val="0"/>
+              </a:spcBef>
+              <a:buNone/>
+            </a:pPr>
+            <a:r>
+              <a:rPr lang="en-US" sz="1800" dirty="0">
+                <a:latin typeface="Consolas" pitchFamily="49" charset="0"/>
+                <a:cs typeface="Consolas" pitchFamily="49" charset="0"/>
+              </a:rPr>
+              <a:t>   ...</a:t>
+            </a:r>
+          </a:p>
+          <a:p>
+            <a:pPr marL="274320" indent="0">
+              <a:spcBef>
+                <a:spcPts val="0"/>
+              </a:spcBef>
+              <a:buNone/>
+            </a:pPr>
+            <a:r>
+              <a:rPr lang="en-US" sz="1800" dirty="0">
+                <a:latin typeface="Consolas" pitchFamily="49" charset="0"/>
+                <a:cs typeface="Consolas" pitchFamily="49" charset="0"/>
+              </a:rPr>
+              <a:t>   LDLADDR 0</a:t>
+            </a:r>
+          </a:p>
+          <a:p>
+            <a:pPr marL="274320" indent="0">
+              <a:spcBef>
+                <a:spcPts val="0"/>
+              </a:spcBef>
+              <a:buNone/>
+            </a:pPr>
+            <a:r>
+              <a:rPr lang="en-US" sz="1800" dirty="0">
+                <a:latin typeface="Consolas" pitchFamily="49" charset="0"/>
+                <a:cs typeface="Consolas" pitchFamily="49" charset="0"/>
+              </a:rPr>
+              <a:t>   LOADW</a:t>
+            </a:r>
+          </a:p>
+          <a:p>
+            <a:pPr marL="274320" indent="0">
+              <a:spcBef>
+                <a:spcPts val="0"/>
+              </a:spcBef>
+              <a:buNone/>
+            </a:pPr>
+            <a:r>
+              <a:rPr lang="en-US" sz="1800" dirty="0">
+                <a:latin typeface="Consolas" pitchFamily="49" charset="0"/>
+                <a:cs typeface="Consolas" pitchFamily="49" charset="0"/>
+              </a:rPr>
+              <a:t>   LDCINT 0</a:t>
+            </a:r>
+          </a:p>
+          <a:p>
+            <a:pPr marL="274320" indent="0">
+              <a:spcBef>
+                <a:spcPts val="0"/>
+              </a:spcBef>
+              <a:buNone/>
+            </a:pPr>
+            <a:r>
+              <a:rPr lang="en-US" sz="1800" dirty="0">
+                <a:latin typeface="Consolas" pitchFamily="49" charset="0"/>
+                <a:cs typeface="Consolas" pitchFamily="49" charset="0"/>
+              </a:rPr>
+              <a:t>   CMP</a:t>
+            </a:r>
+          </a:p>
+          <a:p>
+            <a:pPr marL="274320" indent="0">
+              <a:spcBef>
+                <a:spcPts val="0"/>
+              </a:spcBef>
+              <a:buNone/>
+            </a:pPr>
+            <a:r>
+              <a:rPr lang="en-US" sz="1800" dirty="0">
+                <a:latin typeface="Consolas" pitchFamily="49" charset="0"/>
+                <a:cs typeface="Consolas" pitchFamily="49" charset="0"/>
+              </a:rPr>
+              <a:t>   BG L5</a:t>
+            </a:r>
+          </a:p>
+          <a:p>
+            <a:pPr marL="274320" indent="0">
+              <a:spcBef>
+                <a:spcPts val="0"/>
+              </a:spcBef>
+              <a:buNone/>
+            </a:pPr>
+            <a:r>
+              <a:rPr lang="en-US" sz="1800" dirty="0">
+                <a:latin typeface="Consolas" pitchFamily="49" charset="0"/>
+                <a:cs typeface="Consolas" pitchFamily="49" charset="0"/>
+              </a:rPr>
+              <a:t>   BR L4</a:t>
+            </a:r>
+          </a:p>
+          <a:p>
+            <a:pPr marL="274320" indent="0">
+              <a:spcBef>
+                <a:spcPts val="0"/>
+              </a:spcBef>
+              <a:buNone/>
+            </a:pPr>
+            <a:r>
+              <a:rPr lang="en-US" sz="1800" dirty="0">
+                <a:latin typeface="Consolas" pitchFamily="49" charset="0"/>
+                <a:cs typeface="Consolas" pitchFamily="49" charset="0"/>
+              </a:rPr>
+              <a:t>L5:</a:t>
+            </a:r>
+          </a:p>
+          <a:p>
+            <a:pPr marL="274320" indent="0">
+              <a:spcBef>
+                <a:spcPts val="0"/>
+              </a:spcBef>
+              <a:buNone/>
+            </a:pPr>
+            <a:r>
+              <a:rPr lang="en-US" sz="1800" dirty="0">
+                <a:latin typeface="Consolas" pitchFamily="49" charset="0"/>
+                <a:cs typeface="Consolas" pitchFamily="49" charset="0"/>
+              </a:rPr>
+              <a:t>   BR L9</a:t>
+            </a:r>
+          </a:p>
+          <a:p>
+            <a:pPr marL="274320" indent="0">
+              <a:spcBef>
+                <a:spcPts val="0"/>
+              </a:spcBef>
+              <a:buNone/>
+            </a:pPr>
+            <a:r>
+              <a:rPr lang="en-US" sz="1800" dirty="0">
+                <a:latin typeface="Consolas" pitchFamily="49" charset="0"/>
+                <a:cs typeface="Consolas" pitchFamily="49" charset="0"/>
+              </a:rPr>
+              <a:t>L8:</a:t>
+            </a:r>
+          </a:p>
+          <a:p>
+            <a:pPr marL="274320" indent="0">
+              <a:spcBef>
+                <a:spcPts val="0"/>
+              </a:spcBef>
+              <a:buNone/>
+            </a:pPr>
+            <a:r>
+              <a:rPr lang="en-US" sz="1800" dirty="0">
+                <a:latin typeface="Consolas" pitchFamily="49" charset="0"/>
+                <a:cs typeface="Consolas" pitchFamily="49" charset="0"/>
+              </a:rPr>
+              <a:t>   LDLADDR 0</a:t>
+            </a:r>
+          </a:p>
+          <a:p>
+            <a:pPr marL="274320" indent="0">
+              <a:spcBef>
+                <a:spcPts val="0"/>
+              </a:spcBef>
+              <a:buNone/>
+            </a:pPr>
+            <a:r>
+              <a:rPr lang="en-US" sz="1800" dirty="0">
+                <a:latin typeface="Consolas" pitchFamily="49" charset="0"/>
+                <a:cs typeface="Consolas" pitchFamily="49" charset="0"/>
+              </a:rPr>
+              <a:t>   LOADW</a:t>
+            </a:r>
+          </a:p>
+          <a:p>
+            <a:pPr marL="274320" indent="0">
+              <a:spcBef>
+                <a:spcPts val="0"/>
+              </a:spcBef>
+              <a:buNone/>
+            </a:pPr>
+            <a:r>
+              <a:rPr lang="en-US" sz="1800" dirty="0">
+                <a:latin typeface="Consolas" pitchFamily="49" charset="0"/>
+                <a:cs typeface="Consolas" pitchFamily="49" charset="0"/>
+              </a:rPr>
+              <a:t>   LDCINT 0</a:t>
+            </a:r>
+          </a:p>
+          <a:p>
+            <a:pPr marL="274320" indent="0">
+              <a:spcBef>
+                <a:spcPts val="0"/>
+              </a:spcBef>
+              <a:buNone/>
+            </a:pPr>
+            <a:r>
+              <a:rPr lang="en-US" sz="1800" dirty="0">
+                <a:latin typeface="Consolas" pitchFamily="49" charset="0"/>
+                <a:cs typeface="Consolas" pitchFamily="49" charset="0"/>
+              </a:rPr>
+              <a:t>   ...</a:t>
+            </a:r>
+          </a:p>
+        </p:txBody>
+      </p:sp>
+      <p:sp>
+        <p:nvSpPr>
+          <p:cNvPr id="4" name="Footer Placeholder 3"/>
+          <p:cNvSpPr>
+            <a:spLocks noGrp="1"/>
+          </p:cNvSpPr>
+          <p:nvPr>
+            <p:ph type="ftr" sz="quarter" idx="10"/>
+          </p:nvPr>
+        </p:nvSpPr>
+        <p:spPr/>
+        <p:txBody>
+          <a:bodyPr/>
+          <a:lstStyle/>
+          <a:p>
+            <a:pPr>
+              <a:defRPr/>
+            </a:pPr>
+            <a:r>
+              <a:rPr lang="en-US"/>
+              <a:t>©SoftMoore Consulting</a:t>
+            </a:r>
+          </a:p>
+        </p:txBody>
+      </p:sp>
+      <p:sp>
+        <p:nvSpPr>
+          <p:cNvPr id="5" name="Slide Number Placeholder 4"/>
+          <p:cNvSpPr>
+            <a:spLocks noGrp="1"/>
+          </p:cNvSpPr>
+          <p:nvPr>
+            <p:ph type="sldNum" sz="quarter" idx="11"/>
+          </p:nvPr>
+        </p:nvSpPr>
+        <p:spPr/>
+        <p:txBody>
+          <a:bodyPr/>
+          <a:lstStyle/>
+          <a:p>
+            <a:pPr>
+              <a:defRPr/>
+            </a:pPr>
+            <a:r>
+              <a:rPr lang="en-US"/>
+              <a:t>Slide </a:t>
+            </a:r>
+            <a:fld id="{CD33D74D-A874-47AE-8B06-6763BD644256}" type="slidenum">
+              <a:rPr lang="en-US" smtClean="0"/>
+              <a:pPr>
+                <a:defRPr/>
+              </a:pPr>
+              <a:t>18</a:t>
+            </a:fld>
+            <a:endParaRPr lang="en-US"/>
+          </a:p>
+        </p:txBody>
+      </p:sp>
+      <p:sp>
+        <p:nvSpPr>
+          <p:cNvPr id="6" name="Rectangle 5"/>
+          <p:cNvSpPr/>
+          <p:nvPr/>
+        </p:nvSpPr>
+        <p:spPr bwMode="auto">
+          <a:xfrm>
+            <a:off x="4800600" y="3361765"/>
+            <a:ext cx="2743200" cy="822960"/>
+          </a:xfrm>
+          <a:prstGeom prst="rect">
+            <a:avLst/>
+          </a:prstGeom>
+          <a:noFill/>
+          <a:ln w="9525" cap="flat" cmpd="sng" algn="ctr">
+            <a:solidFill>
+              <a:schemeClr val="tx1"/>
+            </a:solidFill>
+            <a:prstDash val="solid"/>
+            <a:round/>
+            <a:headEnd type="none" w="med" len="med"/>
+            <a:tailEnd type="none" w="med" len="med"/>
+          </a:ln>
+          <a:effectLst/>
+        </p:spPr>
+        <p:txBody>
+          <a:bodyPr vert="horz" wrap="none" lIns="92075" tIns="46038" rIns="92075" bIns="46038" numCol="1" rtlCol="0" anchor="ctr" anchorCtr="0" compatLnSpc="1">
+            <a:prstTxWarp prst="textNoShape">
+              <a:avLst/>
+            </a:prstTxWarp>
+          </a:bodyPr>
+          <a:lstStyle/>
+          <a:p>
+            <a:pPr marL="0" marR="0" indent="0" algn="ctr" defTabSz="914400" rtl="0" eaLnBrk="0" fontAlgn="base" latinLnBrk="0" hangingPunct="0">
+              <a:lnSpc>
+                <a:spcPct val="100000"/>
+              </a:lnSpc>
+              <a:spcBef>
+                <a:spcPct val="0"/>
+              </a:spcBef>
+              <a:spcAft>
+                <a:spcPct val="0"/>
+              </a:spcAft>
+              <a:buClrTx/>
+              <a:buSzTx/>
+              <a:buFontTx/>
+              <a:buNone/>
+              <a:tabLst/>
+            </a:pPr>
+            <a:endParaRPr kumimoji="0" lang="en-US" sz="2400" b="0" i="0" u="none" strike="noStrike" cap="none" normalizeH="0" baseline="0">
+              <a:ln>
+                <a:noFill/>
+              </a:ln>
+              <a:solidFill>
+                <a:schemeClr val="tx1"/>
+              </a:solidFill>
+              <a:effectLst/>
+              <a:latin typeface="Arial" charset="0"/>
+            </a:endParaRPr>
+          </a:p>
+        </p:txBody>
+      </p:sp>
+      <p:sp>
+        <p:nvSpPr>
+          <p:cNvPr id="7" name="TextBox 6"/>
+          <p:cNvSpPr txBox="1"/>
+          <p:nvPr/>
+        </p:nvSpPr>
+        <p:spPr>
+          <a:xfrm>
+            <a:off x="6410156" y="3361765"/>
+            <a:ext cx="1133644" cy="369332"/>
+          </a:xfrm>
+          <a:prstGeom prst="rect">
+            <a:avLst/>
+          </a:prstGeom>
+          <a:noFill/>
+          <a:ln>
+            <a:solidFill>
+              <a:schemeClr val="tx1"/>
+            </a:solidFill>
+          </a:ln>
+        </p:spPr>
+        <p:txBody>
+          <a:bodyPr wrap="none" rtlCol="0">
+            <a:spAutoFit/>
+          </a:bodyPr>
+          <a:lstStyle/>
+          <a:p>
+            <a:r>
+              <a:rPr lang="en-US" sz="1800" dirty="0"/>
+              <a:t>peephole</a:t>
+            </a:r>
+          </a:p>
+        </p:txBody>
+      </p:sp>
+      <p:sp>
+        <p:nvSpPr>
+          <p:cNvPr id="8" name="TextBox 7"/>
+          <p:cNvSpPr txBox="1"/>
+          <p:nvPr/>
+        </p:nvSpPr>
+        <p:spPr>
+          <a:xfrm>
+            <a:off x="3193212" y="3200400"/>
+            <a:ext cx="1531188" cy="1754326"/>
+          </a:xfrm>
+          <a:prstGeom prst="rect">
+            <a:avLst/>
+          </a:prstGeom>
+          <a:noFill/>
+        </p:spPr>
+        <p:txBody>
+          <a:bodyPr wrap="none" rtlCol="0">
+            <a:spAutoFit/>
+          </a:bodyPr>
+          <a:lstStyle/>
+          <a:p>
+            <a:pPr algn="l"/>
+            <a:r>
+              <a:rPr lang="en-US" sz="1800" dirty="0">
+                <a:latin typeface="+mn-lt"/>
+              </a:rPr>
+              <a:t>Optimization:</a:t>
+            </a:r>
+          </a:p>
+          <a:p>
+            <a:pPr algn="l"/>
+            <a:r>
+              <a:rPr lang="en-US" sz="1800" dirty="0">
+                <a:latin typeface="+mn-lt"/>
+              </a:rPr>
+              <a:t>Replace </a:t>
+            </a:r>
+          </a:p>
+          <a:p>
+            <a:pPr algn="l"/>
+            <a:r>
+              <a:rPr lang="en-US" sz="1800" dirty="0">
+                <a:latin typeface="Consolas" panose="020B0609020204030204" pitchFamily="49" charset="0"/>
+              </a:rPr>
+              <a:t>   BG L5</a:t>
+            </a:r>
+          </a:p>
+          <a:p>
+            <a:pPr algn="l"/>
+            <a:r>
+              <a:rPr lang="en-US" sz="1800" dirty="0">
+                <a:latin typeface="Consolas" panose="020B0609020204030204" pitchFamily="49" charset="0"/>
+              </a:rPr>
+              <a:t>   BR L4</a:t>
+            </a:r>
+          </a:p>
+          <a:p>
+            <a:pPr algn="l"/>
+            <a:r>
+              <a:rPr lang="en-US" sz="1800" dirty="0">
+                <a:latin typeface="+mn-lt"/>
+              </a:rPr>
+              <a:t>with</a:t>
+            </a:r>
+          </a:p>
+          <a:p>
+            <a:pPr algn="l"/>
+            <a:r>
+              <a:rPr lang="en-US" sz="1800" dirty="0">
+                <a:latin typeface="Consolas" panose="020B0609020204030204" pitchFamily="49" charset="0"/>
+              </a:rPr>
+              <a:t>   BLE L4</a:t>
+            </a:r>
+            <a:endParaRPr lang="en-US" sz="1800" dirty="0">
+              <a:latin typeface="Consolas" panose="020B0609020204030204" pitchFamily="49" charset="0"/>
+              <a:cs typeface="Consolas" pitchFamily="49" charset="0"/>
+            </a:endParaRPr>
+          </a:p>
+        </p:txBody>
+      </p:sp>
+    </p:spTree>
+  </p:cSld>
+  <p:clrMapOvr>
+    <a:masterClrMapping/>
+  </p:clrMapOvr>
+</p:sld>
+</file>
+
+<file path=ppt/slides/slide19.xml><?xml version="1.0" encoding="utf-8"?>
+<p:sld xmlns:a="http://schemas.openxmlformats.org/drawingml/2006/main" xmlns:r="http://schemas.openxmlformats.org/officeDocument/2006/relationships" xmlns:p="http://schemas.openxmlformats.org/presentationml/2006/main">
+  <p:cSld>
+    <p:spTree>
+      <p:nvGrpSpPr>
+        <p:cNvPr id="1" name=""/>
+        <p:cNvGrpSpPr/>
+        <p:nvPr/>
+      </p:nvGrpSpPr>
+      <p:grpSpPr>
+        <a:xfrm>
+          <a:off x="0" y="0"/>
+          <a:ext cx="0" cy="0"/>
+          <a:chOff x="0" y="0"/>
+          <a:chExt cx="0" cy="0"/>
+        </a:xfrm>
+      </p:grpSpPr>
+      <p:sp>
+        <p:nvSpPr>
           <p:cNvPr id="7" name="Title 6"/>
           <p:cNvSpPr>
             <a:spLocks noGrp="1"/>
@@ -6085,7 +6561,7 @@
           <a:p>
             <a:r>
               <a:rPr lang="en-US" dirty="0"/>
-              <a:t>The CVM assembler performs the following optimizations using a “peephole” approach:</a:t>
+              <a:t>The CVM assembler performs a number of optimizations using a “peephole” approach including:</a:t>
             </a:r>
           </a:p>
           <a:p>
@@ -6188,7 +6664,7 @@
               <a:pPr>
                 <a:defRPr/>
               </a:pPr>
-              <a:t>17</a:t>
+              <a:t>19</a:t>
             </a:fld>
             <a:endParaRPr lang="en-US"/>
           </a:p>

</xml_diff>